<commit_message>
Improvements based on feedback + final OHBM2023 poster
</commit_message>
<xml_diff>
--- a/Bio_psycho_social_HBM.pptx
+++ b/Bio_psycho_social_HBM.pptx
@@ -63,7 +63,7 @@
         <p:txBody>
           <a:bodyPr/>
           <a:p>
-            <a:fld id="{ED790F95-D0D8-45A9-BB98-B4907E1514B2}" type="slidenum">
+            <a:fld id="{8E5C0296-3CEA-4A23-98A4-CD4315E4383F}" type="slidenum">
               <a:t>&lt;#&gt;</a:t>
             </a:fld>
           </a:p>
@@ -125,7 +125,7 @@
         <p:spPr>
           <a:xfrm>
             <a:off x="1600200" y="1641600"/>
-            <a:ext cx="28803240" cy="6871320"/>
+            <a:ext cx="28802880" cy="6870960"/>
           </a:xfrm>
           <a:prstGeom prst="rect">
             <a:avLst/>
@@ -251,7 +251,7 @@
         <p:txBody>
           <a:bodyPr/>
           <a:p>
-            <a:fld id="{907CBBE7-40E0-44AB-B388-AE9B76A5177F}" type="slidenum">
+            <a:fld id="{B4161BAF-C9DF-411B-9B96-01D0371E306F}" type="slidenum">
               <a:t>&lt;#&gt;</a:t>
             </a:fld>
           </a:p>
@@ -313,7 +313,7 @@
         <p:spPr>
           <a:xfrm>
             <a:off x="1600200" y="1641600"/>
-            <a:ext cx="28803240" cy="6871320"/>
+            <a:ext cx="28802880" cy="6870960"/>
           </a:xfrm>
           <a:prstGeom prst="rect">
             <a:avLst/>
@@ -507,7 +507,7 @@
         <p:txBody>
           <a:bodyPr/>
           <a:p>
-            <a:fld id="{E765492E-886A-4061-8D62-DB5A75507713}" type="slidenum">
+            <a:fld id="{4E8EC34A-5BEA-4EE1-852A-53CCB8CDC456}" type="slidenum">
               <a:t>&lt;#&gt;</a:t>
             </a:fld>
           </a:p>
@@ -569,7 +569,7 @@
         <p:spPr>
           <a:xfrm>
             <a:off x="1600200" y="1641600"/>
-            <a:ext cx="28803240" cy="6871320"/>
+            <a:ext cx="28802880" cy="6870960"/>
           </a:xfrm>
           <a:prstGeom prst="rect">
             <a:avLst/>
@@ -831,7 +831,7 @@
         <p:txBody>
           <a:bodyPr/>
           <a:p>
-            <a:fld id="{9CDCB788-DB29-4E6F-8F16-DF19343DD8B6}" type="slidenum">
+            <a:fld id="{2D9B4A5E-BEEB-47FA-B6B1-CD49F1B0FE14}" type="slidenum">
               <a:t>&lt;#&gt;</a:t>
             </a:fld>
           </a:p>
@@ -893,7 +893,7 @@
         <p:spPr>
           <a:xfrm>
             <a:off x="1600200" y="1641600"/>
-            <a:ext cx="28803240" cy="6871320"/>
+            <a:ext cx="28802880" cy="6870960"/>
           </a:xfrm>
           <a:prstGeom prst="rect">
             <a:avLst/>
@@ -988,7 +988,7 @@
         <p:txBody>
           <a:bodyPr/>
           <a:p>
-            <a:fld id="{D3576591-4D4C-4FDD-9479-F211F072223F}" type="slidenum">
+            <a:fld id="{0644FE7B-F79C-4985-892C-9B7BEC24AD5D}" type="slidenum">
               <a:t>&lt;#&gt;</a:t>
             </a:fld>
           </a:p>
@@ -1050,7 +1050,7 @@
         <p:spPr>
           <a:xfrm>
             <a:off x="1600200" y="1641600"/>
-            <a:ext cx="28803240" cy="6871320"/>
+            <a:ext cx="28802880" cy="6870960"/>
           </a:xfrm>
           <a:prstGeom prst="rect">
             <a:avLst/>
@@ -1142,7 +1142,7 @@
         <p:txBody>
           <a:bodyPr/>
           <a:p>
-            <a:fld id="{DA6E7DA3-AE8C-4ED5-BB67-849117FAC697}" type="slidenum">
+            <a:fld id="{A11DFCDD-8846-427A-9002-2C238DBC0EF8}" type="slidenum">
               <a:t>&lt;#&gt;</a:t>
             </a:fld>
           </a:p>
@@ -1204,7 +1204,7 @@
         <p:spPr>
           <a:xfrm>
             <a:off x="1600200" y="1641600"/>
-            <a:ext cx="28803240" cy="6871320"/>
+            <a:ext cx="28802880" cy="6870960"/>
           </a:xfrm>
           <a:prstGeom prst="rect">
             <a:avLst/>
@@ -1330,7 +1330,7 @@
         <p:txBody>
           <a:bodyPr/>
           <a:p>
-            <a:fld id="{27A14D3A-8982-4A85-9860-839D03B35C3B}" type="slidenum">
+            <a:fld id="{05CED6EA-2353-41E8-88C2-B830E2B875D0}" type="slidenum">
               <a:t>&lt;#&gt;</a:t>
             </a:fld>
           </a:p>
@@ -1392,7 +1392,7 @@
         <p:spPr>
           <a:xfrm>
             <a:off x="1600200" y="1641600"/>
-            <a:ext cx="28803240" cy="6871320"/>
+            <a:ext cx="28802880" cy="6870960"/>
           </a:xfrm>
           <a:prstGeom prst="rect">
             <a:avLst/>
@@ -1450,7 +1450,7 @@
         <p:txBody>
           <a:bodyPr/>
           <a:p>
-            <a:fld id="{6F7DFEB3-3089-41C7-8D24-6BAF8E0CA27F}" type="slidenum">
+            <a:fld id="{DD93FA7E-57B8-42EB-B55B-7AD0B4F4ABD8}" type="slidenum">
               <a:t>&lt;#&gt;</a:t>
             </a:fld>
           </a:p>
@@ -1512,7 +1512,7 @@
         <p:spPr>
           <a:xfrm>
             <a:off x="1600200" y="1641600"/>
-            <a:ext cx="28803240" cy="31852800"/>
+            <a:ext cx="28802880" cy="31851000"/>
           </a:xfrm>
           <a:prstGeom prst="rect">
             <a:avLst/>
@@ -1570,7 +1570,7 @@
         <p:txBody>
           <a:bodyPr/>
           <a:p>
-            <a:fld id="{C4A4D9AC-9B8E-428B-9759-CB57A3BA992C}" type="slidenum">
+            <a:fld id="{295520F5-95F4-4AAF-A84E-FDA5FA7F11DC}" type="slidenum">
               <a:t>&lt;#&gt;</a:t>
             </a:fld>
           </a:p>
@@ -1632,7 +1632,7 @@
         <p:spPr>
           <a:xfrm>
             <a:off x="1600200" y="1641600"/>
-            <a:ext cx="28803240" cy="6871320"/>
+            <a:ext cx="28802880" cy="6870960"/>
           </a:xfrm>
           <a:prstGeom prst="rect">
             <a:avLst/>
@@ -1792,7 +1792,7 @@
         <p:txBody>
           <a:bodyPr/>
           <a:p>
-            <a:fld id="{4071DED2-E6CD-46DC-9245-75C3CFD02D23}" type="slidenum">
+            <a:fld id="{A407D02F-FDAC-4754-B52D-7C54E35027DA}" type="slidenum">
               <a:t>&lt;#&gt;</a:t>
             </a:fld>
           </a:p>
@@ -1854,7 +1854,7 @@
         <p:spPr>
           <a:xfrm>
             <a:off x="1600200" y="1641600"/>
-            <a:ext cx="28803240" cy="6871320"/>
+            <a:ext cx="28802880" cy="6870960"/>
           </a:xfrm>
           <a:prstGeom prst="rect">
             <a:avLst/>
@@ -2014,7 +2014,7 @@
         <p:txBody>
           <a:bodyPr/>
           <a:p>
-            <a:fld id="{A7E1C175-D938-43B9-BE0B-4EC32192E18B}" type="slidenum">
+            <a:fld id="{CB0F2C51-B586-47C7-975E-285969444B3F}" type="slidenum">
               <a:t>&lt;#&gt;</a:t>
             </a:fld>
           </a:p>
@@ -2076,7 +2076,7 @@
         <p:spPr>
           <a:xfrm>
             <a:off x="1600200" y="1641600"/>
-            <a:ext cx="28803240" cy="6871320"/>
+            <a:ext cx="28802880" cy="6870960"/>
           </a:xfrm>
           <a:prstGeom prst="rect">
             <a:avLst/>
@@ -2236,7 +2236,7 @@
         <p:txBody>
           <a:bodyPr/>
           <a:p>
-            <a:fld id="{F766AD7E-9ADC-471E-9961-C87F701BE8AA}" type="slidenum">
+            <a:fld id="{3E33CF30-1C69-447E-A166-7060A1E3291F}" type="slidenum">
               <a:t>&lt;#&gt;</a:t>
             </a:fld>
           </a:p>
@@ -2299,13 +2299,53 @@
             <a:spLocks noGrp="1"/>
           </p:cNvSpPr>
           <p:nvPr>
+            <p:ph type="title"/>
+          </p:nvPr>
+        </p:nvSpPr>
+        <p:spPr>
+          <a:xfrm>
+            <a:off x="1600200" y="1641600"/>
+            <a:ext cx="28802880" cy="6870960"/>
+          </a:xfrm>
+          <a:prstGeom prst="rect">
+            <a:avLst/>
+          </a:prstGeom>
+          <a:noFill/>
+          <a:ln w="0">
+            <a:noFill/>
+          </a:ln>
+        </p:spPr>
+        <p:txBody>
+          <a:bodyPr lIns="0" rIns="0" tIns="0" bIns="0" anchor="ctr">
+            <a:noAutofit/>
+          </a:bodyPr>
+          <a:p>
+            <a:r>
+              <a:rPr b="0" lang="en-GB" sz="1800" spc="-1" strike="noStrike">
+                <a:latin typeface="Arial"/>
+              </a:rPr>
+              <a:t>Click to edit the title text format</a:t>
+            </a:r>
+            <a:endParaRPr b="0" lang="en-GB" sz="1800" spc="-1" strike="noStrike">
+              <a:latin typeface="Arial"/>
+            </a:endParaRPr>
+          </a:p>
+        </p:txBody>
+      </p:sp>
+      <p:sp>
+        <p:nvSpPr>
+          <p:cNvPr id="1" name="PlaceHolder 2"/>
+          <p:cNvSpPr>
+            <a:spLocks noGrp="1"/>
+          </p:cNvSpPr>
+          <p:nvPr>
             <p:ph type="ftr" idx="1"/>
           </p:nvPr>
         </p:nvSpPr>
         <p:spPr>
           <a:xfrm>
             <a:off x="10600920" y="38138040"/>
-            <a:ext cx="10800000" cy="2189160"/>
+            <a:ext cx="10799640" cy="2188800"/>
           </a:xfrm>
           <a:prstGeom prst="rect">
             <a:avLst/>
@@ -2351,7 +2391,7 @@
       </p:sp>
       <p:sp>
         <p:nvSpPr>
-          <p:cNvPr id="1" name="PlaceHolder 2"/>
+          <p:cNvPr id="2" name="PlaceHolder 3"/>
           <p:cNvSpPr>
             <a:spLocks noGrp="1"/>
           </p:cNvSpPr>
@@ -2362,7 +2402,7 @@
         <p:spPr>
           <a:xfrm>
             <a:off x="22602600" y="38138040"/>
-            <a:ext cx="7199280" cy="2189160"/>
+            <a:ext cx="7198920" cy="2188800"/>
           </a:xfrm>
           <a:prstGeom prst="rect">
             <a:avLst/>
@@ -2397,7 +2437,7 @@
               </a:lnSpc>
               <a:buNone/>
             </a:pPr>
-            <a:fld id="{66752F3E-D59A-4E47-B114-F9EE83CC68A3}" type="slidenum">
+            <a:fld id="{1FEE20DE-8CA8-4D91-9879-6CB2150E0BAC}" type="slidenum">
               <a:rPr b="0" lang="en-US" sz="3970" spc="-1" strike="noStrike">
                 <a:solidFill>
                   <a:srgbClr val="8b8b8b"/>
@@ -2414,7 +2454,7 @@
       </p:sp>
       <p:sp>
         <p:nvSpPr>
-          <p:cNvPr id="2" name="PlaceHolder 3"/>
+          <p:cNvPr id="3" name="PlaceHolder 4"/>
           <p:cNvSpPr>
             <a:spLocks noGrp="1"/>
           </p:cNvSpPr>
@@ -2425,7 +2465,7 @@
         <p:spPr>
           <a:xfrm>
             <a:off x="2200320" y="38138040"/>
-            <a:ext cx="7199280" cy="2189160"/>
+            <a:ext cx="7198920" cy="2188800"/>
           </a:xfrm>
           <a:prstGeom prst="rect">
             <a:avLst/>
@@ -2455,49 +2495,6 @@
             </a:r>
             <a:endParaRPr b="0" lang="en-GB" sz="1400" spc="-1" strike="noStrike">
               <a:latin typeface="Times New Roman"/>
-            </a:endParaRPr>
-          </a:p>
-        </p:txBody>
-      </p:sp>
-      <p:sp>
-        <p:nvSpPr>
-          <p:cNvPr id="3" name="PlaceHolder 4"/>
-          <p:cNvSpPr>
-            <a:spLocks noGrp="1"/>
-          </p:cNvSpPr>
-          <p:nvPr>
-            <p:ph type="title"/>
-          </p:nvPr>
-        </p:nvSpPr>
-        <p:spPr>
-          <a:xfrm>
-            <a:off x="1600200" y="1641600"/>
-            <a:ext cx="28803240" cy="6871320"/>
-          </a:xfrm>
-          <a:prstGeom prst="rect">
-            <a:avLst/>
-          </a:prstGeom>
-          <a:noFill/>
-          <a:ln w="0">
-            <a:noFill/>
-          </a:ln>
-        </p:spPr>
-        <p:txBody>
-          <a:bodyPr lIns="0" rIns="0" tIns="0" bIns="0" anchor="ctr">
-            <a:noAutofit/>
-          </a:bodyPr>
-          <a:p>
-            <a:pPr algn="ctr">
-              <a:buNone/>
-            </a:pPr>
-            <a:r>
-              <a:rPr b="0" lang="en-GB" sz="4400" spc="-1" strike="noStrike">
-                <a:latin typeface="Arial"/>
-              </a:rPr>
-              <a:t>Click to edit the title text format</a:t>
-            </a:r>
-            <a:endParaRPr b="0" lang="en-GB" sz="4400" spc="-1" strike="noStrike">
-              <a:latin typeface="Arial"/>
             </a:endParaRPr>
           </a:p>
         </p:txBody>
@@ -2738,7 +2735,7 @@
         <p:spPr>
           <a:xfrm>
             <a:off x="0" y="38340000"/>
-            <a:ext cx="32218920" cy="2841840"/>
+            <a:ext cx="32218560" cy="2841480"/>
           </a:xfrm>
           <a:prstGeom prst="rect">
             <a:avLst/>
@@ -2766,7 +2763,7 @@
         <p:spPr>
           <a:xfrm>
             <a:off x="360000" y="38520000"/>
-            <a:ext cx="5399640" cy="2519640"/>
+            <a:ext cx="5399280" cy="2519280"/>
           </a:xfrm>
           <a:prstGeom prst="rect">
             <a:avLst/>
@@ -2778,7 +2775,7 @@
             <a:noFill/>
           </a:ln>
           <a:effectLst>
-            <a:outerShdw dist="114042" dir="2700000" blurRad="723960" rotWithShape="0">
+            <a:outerShdw blurRad="723960" dir="2700000" dist="114042" rotWithShape="0">
               <a:srgbClr val="000000">
                 <a:alpha val="10000"/>
               </a:srgbClr>
@@ -2820,14 +2817,156 @@
       </p:sp>
       <p:sp>
         <p:nvSpPr>
-          <p:cNvPr id="43" name="Rectangle 2"/>
+          <p:cNvPr id="43" name="Rectangle 9"/>
           <p:cNvSpPr/>
           <p:nvPr/>
         </p:nvSpPr>
         <p:spPr>
           <a:xfrm>
-            <a:off x="1897560" y="24145920"/>
-            <a:ext cx="14301720" cy="9000000"/>
+            <a:off x="0" y="-62280"/>
+            <a:ext cx="32218560" cy="5943960"/>
+          </a:xfrm>
+          <a:prstGeom prst="rect">
+            <a:avLst/>
+          </a:prstGeom>
+          <a:solidFill>
+            <a:srgbClr val="262626"/>
+          </a:solidFill>
+          <a:ln w="25560">
+            <a:noFill/>
+          </a:ln>
+        </p:spPr>
+        <p:style>
+          <a:lnRef idx="0"/>
+          <a:fillRef idx="0"/>
+          <a:effectRef idx="0"/>
+          <a:fontRef idx="minor"/>
+        </p:style>
+      </p:sp>
+      <p:sp>
+        <p:nvSpPr>
+          <p:cNvPr id="44" name="Rectangle 1"/>
+          <p:cNvSpPr/>
+          <p:nvPr/>
+        </p:nvSpPr>
+        <p:spPr>
+          <a:xfrm>
+            <a:off x="1882800" y="416160"/>
+            <a:ext cx="27376200" cy="4842720"/>
+          </a:xfrm>
+          <a:prstGeom prst="rect">
+            <a:avLst/>
+          </a:prstGeom>
+          <a:noFill/>
+          <a:ln w="0">
+            <a:noFill/>
+          </a:ln>
+        </p:spPr>
+        <p:style>
+          <a:lnRef idx="0"/>
+          <a:fillRef idx="0"/>
+          <a:effectRef idx="0"/>
+          <a:fontRef idx="minor"/>
+        </p:style>
+        <p:txBody>
+          <a:bodyPr lIns="90000" rIns="90000" tIns="45000" bIns="45000" anchor="t">
+            <a:spAutoFit/>
+          </a:bodyPr>
+          <a:p>
+            <a:pPr>
+              <a:lnSpc>
+                <a:spcPct val="130000"/>
+              </a:lnSpc>
+              <a:buNone/>
+            </a:pPr>
+            <a:r>
+              <a:rPr b="1" lang="en-US" sz="8000" spc="-1" strike="noStrike">
+                <a:solidFill>
+                  <a:srgbClr val="ffffff"/>
+                </a:solidFill>
+                <a:latin typeface="Arial"/>
+                <a:ea typeface="Segoe UI Black"/>
+              </a:rPr>
+              <a:t>Brain age estimates from different white matter microstructure features associate concordantly with bio-psycho-social factors.</a:t>
+            </a:r>
+            <a:endParaRPr b="0" lang="en-GB" sz="8000" spc="-1" strike="noStrike">
+              <a:latin typeface="Arial"/>
+            </a:endParaRPr>
+          </a:p>
+        </p:txBody>
+      </p:sp>
+      <p:sp>
+        <p:nvSpPr>
+          <p:cNvPr id="45" name="TextBox 21"/>
+          <p:cNvSpPr/>
+          <p:nvPr/>
+        </p:nvSpPr>
+        <p:spPr>
+          <a:xfrm>
+            <a:off x="7421040" y="38725200"/>
+            <a:ext cx="18172080" cy="2009880"/>
+          </a:xfrm>
+          <a:prstGeom prst="rect">
+            <a:avLst/>
+          </a:prstGeom>
+          <a:noFill/>
+          <a:ln w="0">
+            <a:noFill/>
+          </a:ln>
+        </p:spPr>
+        <p:style>
+          <a:lnRef idx="0"/>
+          <a:fillRef idx="0"/>
+          <a:effectRef idx="0"/>
+          <a:fontRef idx="minor"/>
+        </p:style>
+        <p:txBody>
+          <a:bodyPr lIns="90000" rIns="90000" tIns="45000" bIns="45000" anchor="t">
+            <a:spAutoFit/>
+          </a:bodyPr>
+          <a:p>
+            <a:pPr>
+              <a:lnSpc>
+                <a:spcPct val="100000"/>
+              </a:lnSpc>
+              <a:buNone/>
+            </a:pPr>
+            <a:r>
+              <a:rPr b="1" lang="en-US" sz="4200" spc="-1" strike="noStrike">
+                <a:solidFill>
+                  <a:srgbClr val="ffffff"/>
+                </a:solidFill>
+                <a:latin typeface="Segoe UI Light"/>
+                <a:ea typeface="Noto Sans CJK SC"/>
+              </a:rPr>
+              <a:t>Max Korbmacher (makor@hvl.no)</a:t>
+            </a:r>
+            <a:r>
+              <a:rPr b="0" lang="en-US" sz="4200" spc="-1" strike="noStrike">
+                <a:solidFill>
+                  <a:srgbClr val="ffffff"/>
+                </a:solidFill>
+                <a:latin typeface="Segoe UI Light"/>
+                <a:ea typeface="Noto Sans CJK SC"/>
+              </a:rPr>
+              <a:t>, Tiril P. Gurholt, Ann-Marie G. de Lange, Dennis van der Meer, Dani Beck, Eli Eikefjord, Arvid Lundervold, Ole A. Andreassen, Lars T. Westlye, Ivan I. Maximov</a:t>
+            </a:r>
+            <a:endParaRPr b="0" lang="en-GB" sz="4200" spc="-1" strike="noStrike">
+              <a:latin typeface="Arial"/>
+            </a:endParaRPr>
+          </a:p>
+        </p:txBody>
+      </p:sp>
+      <p:sp>
+        <p:nvSpPr>
+          <p:cNvPr id="46" name="Rectangle 16"/>
+          <p:cNvSpPr/>
+          <p:nvPr/>
+        </p:nvSpPr>
+        <p:spPr>
+          <a:xfrm>
+            <a:off x="1850760" y="14395680"/>
+            <a:ext cx="14302080" cy="18724320"/>
           </a:xfrm>
           <a:prstGeom prst="rect">
             <a:avLst/>
@@ -2839,7 +2978,7 @@
             <a:noFill/>
           </a:ln>
           <a:effectLst>
-            <a:outerShdw dist="114042" dir="2700000" blurRad="723960" rotWithShape="0">
+            <a:outerShdw blurRad="723960" dir="2700000" dist="114042" rotWithShape="0">
               <a:srgbClr val="000000">
                 <a:alpha val="10000"/>
               </a:srgbClr>
@@ -2881,22 +3020,20 @@
       </p:sp>
       <p:sp>
         <p:nvSpPr>
-          <p:cNvPr id="44" name="Rectangle 9"/>
+          <p:cNvPr id="47" name="TextBox 31"/>
           <p:cNvSpPr/>
           <p:nvPr/>
         </p:nvSpPr>
         <p:spPr>
           <a:xfrm>
-            <a:off x="0" y="-62280"/>
-            <a:ext cx="32218920" cy="5944320"/>
-          </a:xfrm>
-          <a:prstGeom prst="rect">
-            <a:avLst/>
-          </a:prstGeom>
-          <a:solidFill>
-            <a:srgbClr val="262626"/>
-          </a:solidFill>
-          <a:ln w="25560">
+            <a:off x="2229840" y="14865120"/>
+            <a:ext cx="5421240" cy="6810480"/>
+          </a:xfrm>
+          <a:prstGeom prst="rect">
+            <a:avLst/>
+          </a:prstGeom>
+          <a:noFill/>
+          <a:ln w="0">
             <a:noFill/>
           </a:ln>
         </p:spPr>
@@ -2906,22 +3043,70 @@
           <a:effectRef idx="0"/>
           <a:fontRef idx="minor"/>
         </p:style>
-      </p:sp>
-      <p:sp>
-        <p:nvSpPr>
-          <p:cNvPr id="45" name="Rectangle 1"/>
+        <p:txBody>
+          <a:bodyPr lIns="90000" rIns="90000" tIns="45000" bIns="45000" anchor="t">
+            <a:spAutoFit/>
+          </a:bodyPr>
+          <a:p>
+            <a:pPr>
+              <a:lnSpc>
+                <a:spcPct val="150000"/>
+              </a:lnSpc>
+              <a:buNone/>
+            </a:pPr>
+            <a:r>
+              <a:rPr b="1" lang="en-US" sz="3600" spc="-1" strike="noStrike">
+                <a:solidFill>
+                  <a:srgbClr val="000000"/>
+                </a:solidFill>
+                <a:latin typeface="Segoe UI Black"/>
+                <a:ea typeface="Segoe UI Black"/>
+              </a:rPr>
+              <a:t>Result 1a:</a:t>
+            </a:r>
+            <a:r>
+              <a:rPr b="0" lang="en-US" sz="3600" spc="-1" strike="noStrike">
+                <a:solidFill>
+                  <a:srgbClr val="000000"/>
+                </a:solidFill>
+                <a:latin typeface="Segoe UI Black"/>
+                <a:ea typeface="Segoe UI Black"/>
+              </a:rPr>
+              <a:t> Adding blocks of bio-psycho-social variables to a baseline model (including sex, age, &amp; site) changed explained BA variance significantly</a:t>
+            </a:r>
+            <a:r>
+              <a:rPr b="0" lang="en-US" sz="4200" spc="-1" strike="noStrike">
+                <a:solidFill>
+                  <a:srgbClr val="000000"/>
+                </a:solidFill>
+                <a:latin typeface="Segoe UI Black"/>
+                <a:ea typeface="Segoe UI Black"/>
+              </a:rPr>
+              <a:t>.</a:t>
+            </a:r>
+            <a:endParaRPr b="0" lang="en-GB" sz="4200" spc="-1" strike="noStrike">
+              <a:latin typeface="Arial"/>
+            </a:endParaRPr>
+          </a:p>
+        </p:txBody>
+      </p:sp>
+      <p:sp>
+        <p:nvSpPr>
+          <p:cNvPr id="48" name="TextBox 2"/>
           <p:cNvSpPr/>
           <p:nvPr/>
         </p:nvSpPr>
         <p:spPr>
           <a:xfrm>
-            <a:off x="1882800" y="416160"/>
-            <a:ext cx="27376560" cy="4842720"/>
-          </a:xfrm>
-          <a:prstGeom prst="rect">
-            <a:avLst/>
-          </a:prstGeom>
-          <a:noFill/>
+            <a:off x="1882800" y="8767080"/>
+            <a:ext cx="28442880" cy="4979160"/>
+          </a:xfrm>
+          <a:prstGeom prst="rect">
+            <a:avLst/>
+          </a:prstGeom>
+          <a:solidFill>
+            <a:srgbClr val="f2f2f2"/>
+          </a:solidFill>
           <a:ln w="0">
             <a:noFill/>
           </a:ln>
@@ -2933,52 +3118,83 @@
           <a:fontRef idx="minor"/>
         </p:style>
         <p:txBody>
-          <a:bodyPr lIns="90000" rIns="90000" tIns="45000" bIns="45000" anchor="t">
+          <a:bodyPr lIns="432360" rIns="432360" tIns="432360" bIns="432360" anchor="t">
             <a:spAutoFit/>
           </a:bodyPr>
           <a:p>
             <a:pPr>
               <a:lnSpc>
-                <a:spcPct val="130000"/>
+                <a:spcPct val="150000"/>
               </a:lnSpc>
               <a:buNone/>
             </a:pPr>
             <a:r>
-              <a:rPr b="1" lang="en-US" sz="8000" spc="-1" strike="noStrike">
+              <a:rPr b="1" lang="en-US" sz="3600" spc="-1" strike="noStrike">
                 <a:solidFill>
-                  <a:srgbClr val="ffffff"/>
+                  <a:srgbClr val="000000"/>
                 </a:solidFill>
-                <a:latin typeface="Arial"/>
+                <a:latin typeface="Segoe UI"/>
                 <a:ea typeface="Segoe UI Black"/>
               </a:rPr>
-              <a:t>Brain age estimates from different white matter microstructure features associate concordantly</a:t>
-            </a:r>
-            <a:r>
-              <a:rPr b="1" lang="en-US" sz="8000" spc="-1" strike="noStrike">
+              <a:t>Background: </a:t>
+            </a:r>
+            <a:r>
+              <a:rPr b="0" lang="en-US" sz="3600" spc="-1" strike="noStrike">
                 <a:solidFill>
-                  <a:srgbClr val="ffffff"/>
+                  <a:srgbClr val="000000"/>
                 </a:solidFill>
-                <a:latin typeface="Arial"/>
+                <a:latin typeface="Segoe UI"/>
                 <a:ea typeface="Segoe UI Black"/>
               </a:rPr>
-              <a:t> with bio-psycho-social factors.</a:t>
-            </a:r>
-            <a:endParaRPr b="0" lang="en-GB" sz="8000" spc="-1" strike="noStrike">
-              <a:latin typeface="Arial"/>
-            </a:endParaRPr>
-          </a:p>
-        </p:txBody>
-      </p:sp>
-      <p:sp>
-        <p:nvSpPr>
-          <p:cNvPr id="46" name="TextBox 21"/>
+              <a:t>Brain age (BA) has previously been described as a general health marker. Yet, BA’s associations with various bio-psycho-social factors have not been layed out in a structured way.</a:t>
+            </a:r>
+            <a:endParaRPr b="0" lang="en-GB" sz="3600" spc="-1" strike="noStrike">
+              <a:latin typeface="Arial"/>
+            </a:endParaRPr>
+          </a:p>
+          <a:p>
+            <a:pPr>
+              <a:lnSpc>
+                <a:spcPct val="150000"/>
+              </a:lnSpc>
+              <a:buNone/>
+            </a:pPr>
+            <a:r>
+              <a:rPr b="1" lang="en-US" sz="3600" spc="-1" strike="noStrike">
+                <a:solidFill>
+                  <a:srgbClr val="000000"/>
+                </a:solidFill>
+                <a:latin typeface="Segoe UI"/>
+                <a:ea typeface="Segoe UI Black"/>
+              </a:rPr>
+              <a:t>Method:</a:t>
+            </a:r>
+            <a:r>
+              <a:rPr b="0" lang="en-US" sz="3600" spc="-1" strike="noStrike">
+                <a:solidFill>
+                  <a:srgbClr val="000000"/>
+                </a:solidFill>
+                <a:latin typeface="Segoe UI"/>
+                <a:ea typeface="Segoe UI Black"/>
+              </a:rPr>
+              <a:t>  BAs of UK Biobank participants (N = 35,749, 44.6–82.8 years of age) estimated from white matter microstructure features were associated with bio-psycho-social variables within the domains of sociodemographic, cognitive, life-satisfaction, as well as health and lifestyle.</a:t>
+            </a:r>
+            <a:endParaRPr b="0" lang="en-GB" sz="3600" spc="-1" strike="noStrike">
+              <a:latin typeface="Arial"/>
+            </a:endParaRPr>
+          </a:p>
+        </p:txBody>
+      </p:sp>
+      <p:sp>
+        <p:nvSpPr>
+          <p:cNvPr id="49" name="TextBox 40"/>
           <p:cNvSpPr/>
           <p:nvPr/>
         </p:nvSpPr>
         <p:spPr>
           <a:xfrm>
-            <a:off x="7421040" y="38725200"/>
-            <a:ext cx="18172440" cy="2009880"/>
+            <a:off x="1839600" y="6276240"/>
+            <a:ext cx="29174400" cy="1991160"/>
           </a:xfrm>
           <a:prstGeom prst="rect">
             <a:avLst/>
@@ -3006,41 +3222,433 @@
               <a:buNone/>
             </a:pPr>
             <a:r>
-              <a:rPr b="1" lang="en-US" sz="4200" spc="-1" strike="noStrike">
+              <a:rPr b="0" i="1" lang="en-US" sz="6240" spc="-1" strike="noStrike">
+                <a:solidFill>
+                  <a:srgbClr val="262626"/>
+                </a:solidFill>
+                <a:latin typeface="Segoe UI"/>
+                <a:ea typeface="DejaVu Sans"/>
+              </a:rPr>
+              <a:t>Bio-psycho-social factors’ associations with brain age: a large-scale UK Biobank diffusion study of 35,749 participants</a:t>
+            </a:r>
+            <a:endParaRPr b="0" lang="en-GB" sz="6240" spc="-1" strike="noStrike">
+              <a:latin typeface="Arial"/>
+            </a:endParaRPr>
+          </a:p>
+        </p:txBody>
+      </p:sp>
+      <p:sp>
+        <p:nvSpPr>
+          <p:cNvPr id="50" name="TextBox 1"/>
+          <p:cNvSpPr/>
+          <p:nvPr/>
+        </p:nvSpPr>
+        <p:spPr>
+          <a:xfrm>
+            <a:off x="2160000" y="23639040"/>
+            <a:ext cx="14038920" cy="1736280"/>
+          </a:xfrm>
+          <a:prstGeom prst="rect">
+            <a:avLst/>
+          </a:prstGeom>
+          <a:noFill/>
+          <a:ln w="0">
+            <a:noFill/>
+          </a:ln>
+        </p:spPr>
+        <p:style>
+          <a:lnRef idx="0"/>
+          <a:fillRef idx="0"/>
+          <a:effectRef idx="0"/>
+          <a:fontRef idx="minor"/>
+        </p:style>
+        <p:txBody>
+          <a:bodyPr lIns="90000" rIns="90000" tIns="45000" bIns="45000" anchor="t">
+            <a:spAutoFit/>
+          </a:bodyPr>
+          <a:p>
+            <a:pPr>
+              <a:lnSpc>
+                <a:spcPct val="150000"/>
+              </a:lnSpc>
+              <a:buNone/>
+            </a:pPr>
+            <a:r>
+              <a:rPr b="1" lang="en-US" sz="3600" spc="-1" strike="noStrike">
+                <a:solidFill>
+                  <a:srgbClr val="000000"/>
+                </a:solidFill>
+                <a:latin typeface="Segoe UI Black"/>
+                <a:ea typeface="Segoe UI Black"/>
+              </a:rPr>
+              <a:t>Result 1b:</a:t>
+            </a:r>
+            <a:r>
+              <a:rPr b="0" lang="en-US" sz="3600" spc="-1" strike="noStrike">
+                <a:solidFill>
+                  <a:srgbClr val="000000"/>
+                </a:solidFill>
+                <a:latin typeface="Segoe UI Black"/>
+                <a:ea typeface="Segoe UI Black"/>
+              </a:rPr>
+              <a:t> Yet, the changes in variance explained were relatively small: </a:t>
+            </a:r>
+            <a:r>
+              <a:rPr b="0" i="1" lang="en-US" sz="3600" spc="-1" strike="noStrike">
+                <a:solidFill>
+                  <a:srgbClr val="000000"/>
+                </a:solidFill>
+                <a:latin typeface="Segoe UI Black"/>
+                <a:ea typeface="Segoe UI Black"/>
+              </a:rPr>
+              <a:t>R</a:t>
+            </a:r>
+            <a:r>
+              <a:rPr b="0" lang="en-US" sz="3600" spc="-1" strike="noStrike" baseline="33000">
+                <a:solidFill>
+                  <a:srgbClr val="000000"/>
+                </a:solidFill>
+                <a:latin typeface="Segoe UI Black"/>
+                <a:ea typeface="Segoe UI Black"/>
+              </a:rPr>
+              <a:t>2</a:t>
+            </a:r>
+            <a:r>
+              <a:rPr b="0" lang="en-US" sz="3600" spc="-1" strike="noStrike">
+                <a:solidFill>
+                  <a:srgbClr val="000000"/>
+                </a:solidFill>
+                <a:latin typeface="Segoe UI Black"/>
+                <a:ea typeface="Segoe UI Black"/>
+              </a:rPr>
+              <a:t>&lt;3%.</a:t>
+            </a:r>
+            <a:endParaRPr b="0" lang="en-GB" sz="3600" spc="-1" strike="noStrike">
+              <a:latin typeface="Arial"/>
+            </a:endParaRPr>
+          </a:p>
+        </p:txBody>
+      </p:sp>
+      <p:pic>
+        <p:nvPicPr>
+          <p:cNvPr id="51" name="" descr=""/>
+          <p:cNvPicPr/>
+          <p:nvPr/>
+        </p:nvPicPr>
+        <p:blipFill>
+          <a:blip r:embed="rId1"/>
+          <a:stretch/>
+        </p:blipFill>
+        <p:spPr>
+          <a:xfrm>
+            <a:off x="4669920" y="39248640"/>
+            <a:ext cx="1078560" cy="1078560"/>
+          </a:xfrm>
+          <a:prstGeom prst="rect">
+            <a:avLst/>
+          </a:prstGeom>
+          <a:ln w="0">
+            <a:noFill/>
+          </a:ln>
+        </p:spPr>
+      </p:pic>
+      <p:pic>
+        <p:nvPicPr>
+          <p:cNvPr id="52" name="" descr=""/>
+          <p:cNvPicPr/>
+          <p:nvPr/>
+        </p:nvPicPr>
+        <p:blipFill>
+          <a:blip r:embed="rId2"/>
+          <a:stretch/>
+        </p:blipFill>
+        <p:spPr>
+          <a:xfrm>
+            <a:off x="462600" y="38619360"/>
+            <a:ext cx="3983400" cy="1152000"/>
+          </a:xfrm>
+          <a:prstGeom prst="rect">
+            <a:avLst/>
+          </a:prstGeom>
+          <a:ln w="0">
+            <a:noFill/>
+          </a:ln>
+        </p:spPr>
+      </p:pic>
+      <p:pic>
+        <p:nvPicPr>
+          <p:cNvPr id="53" name="" descr=""/>
+          <p:cNvPicPr/>
+          <p:nvPr/>
+        </p:nvPicPr>
+        <p:blipFill>
+          <a:blip r:embed="rId3"/>
+          <a:stretch/>
+        </p:blipFill>
+        <p:spPr>
+          <a:xfrm>
+            <a:off x="451080" y="40028040"/>
+            <a:ext cx="3687480" cy="937080"/>
+          </a:xfrm>
+          <a:prstGeom prst="rect">
+            <a:avLst/>
+          </a:prstGeom>
+          <a:ln w="0">
+            <a:noFill/>
+          </a:ln>
+        </p:spPr>
+      </p:pic>
+      <p:sp>
+        <p:nvSpPr>
+          <p:cNvPr id="54" name="TextBox 3"/>
+          <p:cNvSpPr/>
+          <p:nvPr/>
+        </p:nvSpPr>
+        <p:spPr>
+          <a:xfrm>
+            <a:off x="1882800" y="33779520"/>
+            <a:ext cx="28536120" cy="4156200"/>
+          </a:xfrm>
+          <a:prstGeom prst="rect">
+            <a:avLst/>
+          </a:prstGeom>
+          <a:solidFill>
+            <a:srgbClr val="f2f2f2"/>
+          </a:solidFill>
+          <a:ln w="0">
+            <a:noFill/>
+          </a:ln>
+        </p:spPr>
+        <p:style>
+          <a:lnRef idx="0"/>
+          <a:fillRef idx="0"/>
+          <a:effectRef idx="0"/>
+          <a:fontRef idx="minor"/>
+        </p:style>
+        <p:txBody>
+          <a:bodyPr lIns="432360" rIns="432360" tIns="432360" bIns="432360" anchor="t">
+            <a:spAutoFit/>
+          </a:bodyPr>
+          <a:p>
+            <a:pPr>
+              <a:lnSpc>
+                <a:spcPct val="150000"/>
+              </a:lnSpc>
+              <a:buNone/>
+            </a:pPr>
+            <a:r>
+              <a:rPr b="1" lang="en-US" sz="3600" spc="-1" strike="noStrike">
+                <a:solidFill>
+                  <a:srgbClr val="000000"/>
+                </a:solidFill>
+                <a:latin typeface="Segoe UI"/>
+                <a:ea typeface="Segoe UI Black"/>
+              </a:rPr>
+              <a:t>Conclusion:</a:t>
+            </a:r>
+            <a:r>
+              <a:rPr b="0" lang="en-US" sz="3600" spc="-1" strike="noStrike">
+                <a:solidFill>
+                  <a:srgbClr val="000000"/>
+                </a:solidFill>
+                <a:latin typeface="Segoe UI"/>
+                <a:ea typeface="Segoe UI Black"/>
+              </a:rPr>
+              <a:t> Our results indicate BA as a general marker of health. Moreover, associations of white matter BA with bio-psycho-social factors are robust to different WM diffusion modelling assumptions. A potentially fruitful guiding principal for future brain age associations research could be to focus on measures which are directly or indirectly related to or reflect pathology.</a:t>
+            </a:r>
+            <a:endParaRPr b="0" lang="en-GB" sz="3600" spc="-1" strike="noStrike">
+              <a:latin typeface="Arial"/>
+            </a:endParaRPr>
+          </a:p>
+        </p:txBody>
+      </p:sp>
+      <p:sp>
+        <p:nvSpPr>
+          <p:cNvPr id="55" name=""/>
+          <p:cNvSpPr/>
+          <p:nvPr/>
+        </p:nvSpPr>
+        <p:spPr>
+          <a:xfrm>
+            <a:off x="27450720" y="40409640"/>
+            <a:ext cx="7199280" cy="1634400"/>
+          </a:xfrm>
+          <a:prstGeom prst="rect">
+            <a:avLst/>
+          </a:prstGeom>
+          <a:noFill/>
+          <a:ln w="0">
+            <a:noFill/>
+          </a:ln>
+        </p:spPr>
+        <p:style>
+          <a:lnRef idx="0"/>
+          <a:fillRef idx="0"/>
+          <a:effectRef idx="0"/>
+          <a:fontRef idx="minor"/>
+        </p:style>
+        <p:txBody>
+          <a:bodyPr lIns="90000" rIns="90000" tIns="45000" bIns="45000" anchor="t">
+            <a:noAutofit/>
+          </a:bodyPr>
+          <a:p>
+            <a:pPr>
+              <a:lnSpc>
+                <a:spcPct val="100000"/>
+              </a:lnSpc>
+              <a:buNone/>
+            </a:pPr>
+            <a:r>
+              <a:rPr b="0" lang="en-US" sz="3600" spc="-1" strike="noStrike">
                 <a:solidFill>
                   <a:srgbClr val="ffffff"/>
                 </a:solidFill>
                 <a:latin typeface="Segoe UI Light"/>
-                <a:ea typeface="Noto Sans CJK SC"/>
+                <a:ea typeface="DejaVu Sans"/>
               </a:rPr>
-              <a:t>Max Korbmacher (makor@hvl.no)</a:t>
-            </a:r>
-            <a:r>
-              <a:rPr b="0" lang="en-US" sz="4200" spc="-1" strike="noStrike">
-                <a:solidFill>
-                  <a:srgbClr val="ffffff"/>
-                </a:solidFill>
-                <a:latin typeface="Segoe UI Light"/>
-                <a:ea typeface="Noto Sans CJK SC"/>
-              </a:rPr>
-              <a:t>, Tiril P. Gurholt, Ann-Marie G. de Lange, Dennis van der Meer, Dani Beck, Eli Eikefjord, Arvid Lundervold, Ole A. Andreassen, Lars T. Westlye, Ivan I. Maximov</a:t>
-            </a:r>
-            <a:endParaRPr b="0" lang="en-GB" sz="4200" spc="-1" strike="noStrike">
-              <a:latin typeface="Arial"/>
-            </a:endParaRPr>
-          </a:p>
-        </p:txBody>
-      </p:sp>
-      <p:sp>
-        <p:nvSpPr>
-          <p:cNvPr id="47" name="Rectangle 16"/>
+              <a:t>To the paper</a:t>
+            </a:r>
+            <a:endParaRPr b="0" lang="en-GB" sz="3600" spc="-1" strike="noStrike">
+              <a:latin typeface="Arial"/>
+            </a:endParaRPr>
+          </a:p>
+        </p:txBody>
+      </p:sp>
+      <p:pic>
+        <p:nvPicPr>
+          <p:cNvPr id="56" name="" descr=""/>
+          <p:cNvPicPr/>
+          <p:nvPr/>
+        </p:nvPicPr>
+        <p:blipFill>
+          <a:blip r:embed="rId4"/>
+          <a:stretch/>
+        </p:blipFill>
+        <p:spPr>
+          <a:xfrm>
+            <a:off x="3058920" y="25700040"/>
+            <a:ext cx="11805120" cy="7090560"/>
+          </a:xfrm>
+          <a:prstGeom prst="rect">
+            <a:avLst/>
+          </a:prstGeom>
+          <a:ln w="0">
+            <a:noFill/>
+          </a:ln>
+        </p:spPr>
+      </p:pic>
+      <p:sp>
+        <p:nvSpPr>
+          <p:cNvPr id="57" name=""/>
           <p:cNvSpPr/>
           <p:nvPr/>
         </p:nvSpPr>
         <p:spPr>
           <a:xfrm>
-            <a:off x="1850760" y="14395680"/>
-            <a:ext cx="14302440" cy="9095760"/>
+            <a:off x="9000000" y="22455360"/>
+            <a:ext cx="7199640" cy="716760"/>
+          </a:xfrm>
+          <a:prstGeom prst="rect">
+            <a:avLst/>
+          </a:prstGeom>
+          <a:noFill/>
+          <a:ln w="0">
+            <a:noFill/>
+          </a:ln>
+        </p:spPr>
+        <p:style>
+          <a:lnRef idx="0"/>
+          <a:fillRef idx="0"/>
+          <a:effectRef idx="0"/>
+          <a:fontRef idx="minor"/>
+        </p:style>
+        <p:txBody>
+          <a:bodyPr lIns="90000" rIns="90000" tIns="45000" bIns="45000" anchor="t">
+            <a:noAutofit/>
+          </a:bodyPr>
+          <a:p>
+            <a:pPr>
+              <a:lnSpc>
+                <a:spcPct val="100000"/>
+              </a:lnSpc>
+              <a:buNone/>
+            </a:pPr>
+            <a:r>
+              <a:rPr b="0" lang="en-US" sz="1000" spc="-1" strike="noStrike">
+                <a:solidFill>
+                  <a:srgbClr val="000000"/>
+                </a:solidFill>
+                <a:latin typeface="Segoe UI Black"/>
+                <a:ea typeface="Segoe UI Black"/>
+              </a:rPr>
+              <a:t>WMTI = white matter tract integrity, SMT mc = multi-compartment spherical mean technique,  SMT =  spherical mean technique, MEAN = whole brain average brain age, FULL = all diffusion features combined, DTI = diffusion tensor imaging, DKI = diffusion kurtosis imaging, BRIA = Bayesian rotationally invariant approach. Note that only values of </a:t>
+            </a:r>
+            <a:r>
+              <a:rPr b="0" i="1" lang="en-US" sz="1000" spc="-1" strike="noStrike">
+                <a:solidFill>
+                  <a:srgbClr val="000000"/>
+                </a:solidFill>
+                <a:latin typeface="Segoe UI Black"/>
+                <a:ea typeface="Segoe UI Black"/>
+              </a:rPr>
+              <a:t>χ</a:t>
+            </a:r>
+            <a:r>
+              <a:rPr b="0" lang="en-US" sz="1000" spc="-1" strike="noStrike" baseline="33000">
+                <a:solidFill>
+                  <a:srgbClr val="000000"/>
+                </a:solidFill>
+                <a:latin typeface="Segoe UI Black"/>
+                <a:ea typeface="Segoe UI Black"/>
+              </a:rPr>
+              <a:t>2</a:t>
+            </a:r>
+            <a:r>
+              <a:rPr b="0" lang="en-US" sz="1000" spc="-1" strike="noStrike">
+                <a:solidFill>
+                  <a:srgbClr val="000000"/>
+                </a:solidFill>
+                <a:latin typeface="Segoe UI Black"/>
+                <a:ea typeface="Segoe UI Black"/>
+              </a:rPr>
+              <a:t> &gt; 11 were significant (</a:t>
+            </a:r>
+            <a:r>
+              <a:rPr b="0" i="1" lang="en-US" sz="1000" spc="-1" strike="noStrike">
+                <a:solidFill>
+                  <a:srgbClr val="000000"/>
+                </a:solidFill>
+                <a:latin typeface="Segoe UI Black"/>
+                <a:ea typeface="Segoe UI Black"/>
+              </a:rPr>
+              <a:t>p</a:t>
+            </a:r>
+            <a:r>
+              <a:rPr b="0" lang="en-US" sz="1000" spc="-1" strike="noStrike">
+                <a:solidFill>
+                  <a:srgbClr val="000000"/>
+                </a:solidFill>
+                <a:latin typeface="Segoe UI Black"/>
+                <a:ea typeface="Segoe UI Black"/>
+              </a:rPr>
+              <a:t> &lt; 0.05).</a:t>
+            </a:r>
+            <a:endParaRPr b="0" lang="en-GB" sz="1000" spc="-1" strike="noStrike">
+              <a:latin typeface="Arial"/>
+            </a:endParaRPr>
+          </a:p>
+        </p:txBody>
+      </p:sp>
+      <p:sp>
+        <p:nvSpPr>
+          <p:cNvPr id="58" name="Rectangle 5"/>
+          <p:cNvSpPr/>
+          <p:nvPr/>
+        </p:nvSpPr>
+        <p:spPr>
+          <a:xfrm>
+            <a:off x="17098200" y="14440680"/>
+            <a:ext cx="13401360" cy="18678960"/>
           </a:xfrm>
           <a:prstGeom prst="rect">
             <a:avLst/>
@@ -3052,7 +3660,7 @@
             <a:noFill/>
           </a:ln>
           <a:effectLst>
-            <a:outerShdw dist="114042" dir="2700000" blurRad="723960" rotWithShape="0">
+            <a:outerShdw blurRad="723960" dir="2700000" dist="114042" rotWithShape="0">
               <a:srgbClr val="000000">
                 <a:alpha val="10000"/>
               </a:srgbClr>
@@ -3094,263 +3702,14 @@
       </p:sp>
       <p:sp>
         <p:nvSpPr>
-          <p:cNvPr id="48" name="TextBox 31"/>
+          <p:cNvPr id="59" name="TextBox 5"/>
           <p:cNvSpPr/>
           <p:nvPr/>
         </p:nvSpPr>
         <p:spPr>
           <a:xfrm>
-            <a:off x="2091600" y="14571360"/>
-            <a:ext cx="5421600" cy="8457120"/>
-          </a:xfrm>
-          <a:prstGeom prst="rect">
-            <a:avLst/>
-          </a:prstGeom>
-          <a:noFill/>
-          <a:ln w="0">
-            <a:noFill/>
-          </a:ln>
-        </p:spPr>
-        <p:style>
-          <a:lnRef idx="0"/>
-          <a:fillRef idx="0"/>
-          <a:effectRef idx="0"/>
-          <a:fontRef idx="minor"/>
-        </p:style>
-        <p:txBody>
-          <a:bodyPr lIns="90000" rIns="90000" tIns="45000" bIns="45000" anchor="t">
-            <a:spAutoFit/>
-          </a:bodyPr>
-          <a:p>
-            <a:pPr>
-              <a:lnSpc>
-                <a:spcPct val="150000"/>
-              </a:lnSpc>
-              <a:buNone/>
-            </a:pPr>
-            <a:r>
-              <a:rPr b="1" lang="en-US" sz="3600" spc="-1" strike="noStrike">
-                <a:solidFill>
-                  <a:srgbClr val="000000"/>
-                </a:solidFill>
-                <a:latin typeface="Segoe UI Black"/>
-                <a:ea typeface="Segoe UI Black"/>
-              </a:rPr>
-              <a:t>Result 1:</a:t>
-            </a:r>
-            <a:r>
-              <a:rPr b="0" lang="en-US" sz="3600" spc="-1" strike="noStrike">
-                <a:solidFill>
-                  <a:srgbClr val="000000"/>
-                </a:solidFill>
-                <a:latin typeface="Segoe UI Black"/>
-                <a:ea typeface="Segoe UI Black"/>
-              </a:rPr>
-              <a:t> Adding blocks of cognitive function, health and lifestyle, life satisfaction, and socio-demographic variables to a baseline model changed BA variance explained significantly</a:t>
-            </a:r>
-            <a:r>
-              <a:rPr b="0" lang="en-US" sz="4200" spc="-1" strike="noStrike">
-                <a:solidFill>
-                  <a:srgbClr val="000000"/>
-                </a:solidFill>
-                <a:latin typeface="Segoe UI Black"/>
-                <a:ea typeface="Segoe UI Black"/>
-              </a:rPr>
-              <a:t>.</a:t>
-            </a:r>
-            <a:endParaRPr b="0" lang="en-GB" sz="4200" spc="-1" strike="noStrike">
-              <a:latin typeface="Arial"/>
-            </a:endParaRPr>
-          </a:p>
-        </p:txBody>
-      </p:sp>
-      <p:sp>
-        <p:nvSpPr>
-          <p:cNvPr id="49" name="TextBox 2"/>
-          <p:cNvSpPr/>
-          <p:nvPr/>
-        </p:nvSpPr>
-        <p:spPr>
-          <a:xfrm>
-            <a:off x="1882800" y="8767080"/>
-            <a:ext cx="28443240" cy="4979880"/>
-          </a:xfrm>
-          <a:prstGeom prst="rect">
-            <a:avLst/>
-          </a:prstGeom>
-          <a:solidFill>
-            <a:srgbClr val="f2f2f2"/>
-          </a:solidFill>
-          <a:ln w="0">
-            <a:noFill/>
-          </a:ln>
-        </p:spPr>
-        <p:style>
-          <a:lnRef idx="0"/>
-          <a:fillRef idx="0"/>
-          <a:effectRef idx="0"/>
-          <a:fontRef idx="minor"/>
-        </p:style>
-        <p:txBody>
-          <a:bodyPr lIns="432360" rIns="432360" tIns="432360" bIns="432360" anchor="t">
-            <a:spAutoFit/>
-          </a:bodyPr>
-          <a:p>
-            <a:pPr>
-              <a:lnSpc>
-                <a:spcPct val="150000"/>
-              </a:lnSpc>
-              <a:buNone/>
-            </a:pPr>
-            <a:r>
-              <a:rPr b="1" lang="en-US" sz="3600" spc="-1" strike="noStrike">
-                <a:solidFill>
-                  <a:srgbClr val="000000"/>
-                </a:solidFill>
-                <a:latin typeface="Segoe UI"/>
-                <a:ea typeface="Segoe UI Black"/>
-              </a:rPr>
-              <a:t>Background: </a:t>
-            </a:r>
-            <a:r>
-              <a:rPr b="0" lang="en-US" sz="3600" spc="-1" strike="noStrike">
-                <a:solidFill>
-                  <a:srgbClr val="000000"/>
-                </a:solidFill>
-                <a:latin typeface="Segoe UI"/>
-                <a:ea typeface="Segoe UI Black"/>
-              </a:rPr>
-              <a:t>Brain age (BA) has previously been described as a general health marker. Yet, BA’s associations with various bio-psycho-social factors have not been layed out in a structured way.</a:t>
-            </a:r>
-            <a:endParaRPr b="0" lang="en-GB" sz="3600" spc="-1" strike="noStrike">
-              <a:latin typeface="Arial"/>
-            </a:endParaRPr>
-          </a:p>
-          <a:p>
-            <a:pPr>
-              <a:lnSpc>
-                <a:spcPct val="150000"/>
-              </a:lnSpc>
-              <a:buNone/>
-            </a:pPr>
-            <a:r>
-              <a:rPr b="1" lang="en-US" sz="3600" spc="-1" strike="noStrike">
-                <a:solidFill>
-                  <a:srgbClr val="000000"/>
-                </a:solidFill>
-                <a:latin typeface="Segoe UI"/>
-                <a:ea typeface="Segoe UI Black"/>
-              </a:rPr>
-              <a:t>Method:</a:t>
-            </a:r>
-            <a:r>
-              <a:rPr b="0" lang="en-US" sz="3600" spc="-1" strike="noStrike">
-                <a:solidFill>
-                  <a:srgbClr val="000000"/>
-                </a:solidFill>
-                <a:latin typeface="Segoe UI"/>
-                <a:ea typeface="Segoe UI Black"/>
-              </a:rPr>
-              <a:t>  BAs of UK Biobank participants </a:t>
-            </a:r>
-            <a:r>
-              <a:rPr b="0" lang="en-US" sz="3600" spc="-1" strike="noStrike">
-                <a:solidFill>
-                  <a:srgbClr val="000000"/>
-                </a:solidFill>
-                <a:latin typeface="Segoe UI"/>
-                <a:ea typeface="Segoe UI Black"/>
-              </a:rPr>
-              <a:t>(N = 35,749, 44.6–82.8 years of age) estimated from </a:t>
-            </a:r>
-            <a:r>
-              <a:rPr b="0" lang="en-US" sz="3600" spc="-1" strike="noStrike">
-                <a:solidFill>
-                  <a:srgbClr val="000000"/>
-                </a:solidFill>
-                <a:latin typeface="Segoe UI"/>
-                <a:ea typeface="Segoe UI Black"/>
-              </a:rPr>
-              <a:t>white matter microstructure features were associated with bio-psycho-social variables </a:t>
-            </a:r>
-            <a:r>
-              <a:rPr b="0" lang="en-US" sz="3600" spc="-1" strike="noStrike">
-                <a:solidFill>
-                  <a:srgbClr val="000000"/>
-                </a:solidFill>
-                <a:latin typeface="Segoe UI"/>
-                <a:ea typeface="Segoe UI Black"/>
-              </a:rPr>
-              <a:t>within the domains of sociodemographic, cognitive, life-satisfaction, as well as health and lifestyle.</a:t>
-            </a:r>
-            <a:endParaRPr b="0" lang="en-GB" sz="3600" spc="-1" strike="noStrike">
-              <a:latin typeface="Arial"/>
-            </a:endParaRPr>
-          </a:p>
-        </p:txBody>
-      </p:sp>
-      <p:sp>
-        <p:nvSpPr>
-          <p:cNvPr id="50" name="TextBox 40"/>
-          <p:cNvSpPr/>
-          <p:nvPr/>
-        </p:nvSpPr>
-        <p:spPr>
-          <a:xfrm>
-            <a:off x="1839600" y="6276240"/>
-            <a:ext cx="29174760" cy="1991160"/>
-          </a:xfrm>
-          <a:prstGeom prst="rect">
-            <a:avLst/>
-          </a:prstGeom>
-          <a:noFill/>
-          <a:ln w="0">
-            <a:noFill/>
-          </a:ln>
-        </p:spPr>
-        <p:style>
-          <a:lnRef idx="0"/>
-          <a:fillRef idx="0"/>
-          <a:effectRef idx="0"/>
-          <a:fontRef idx="minor"/>
-        </p:style>
-        <p:txBody>
-          <a:bodyPr lIns="90000" rIns="90000" tIns="45000" bIns="45000" anchor="t">
-            <a:spAutoFit/>
-          </a:bodyPr>
-          <a:p>
-            <a:pPr>
-              <a:lnSpc>
-                <a:spcPct val="100000"/>
-              </a:lnSpc>
-              <a:buNone/>
-            </a:pPr>
-            <a:r>
-              <a:rPr b="0" i="1" lang="en-US" sz="6240" spc="-1" strike="noStrike">
-                <a:solidFill>
-                  <a:srgbClr val="262626"/>
-                </a:solidFill>
-                <a:latin typeface="Segoe UI"/>
-                <a:ea typeface="DejaVu Sans"/>
-              </a:rPr>
-              <a:t>Bio-psycho-social factors’ associations with brain age: a large-scale UK Biobank diffusion study of 35,749 participants</a:t>
-            </a:r>
-            <a:endParaRPr b="0" lang="en-GB" sz="6240" spc="-1" strike="noStrike">
-              <a:latin typeface="Arial"/>
-            </a:endParaRPr>
-          </a:p>
-        </p:txBody>
-      </p:sp>
-      <p:sp>
-        <p:nvSpPr>
-          <p:cNvPr id="51" name="TextBox 1"/>
-          <p:cNvSpPr/>
-          <p:nvPr/>
-        </p:nvSpPr>
-        <p:spPr>
-          <a:xfrm>
-            <a:off x="2160000" y="24267240"/>
-            <a:ext cx="14039280" cy="913320"/>
+            <a:off x="17360640" y="14544000"/>
+            <a:ext cx="12778920" cy="18194760"/>
           </a:xfrm>
           <a:prstGeom prst="rect">
             <a:avLst/>
@@ -3395,18 +3754,140 @@
                 <a:latin typeface="Segoe UI Black"/>
                 <a:ea typeface="Segoe UI Black"/>
               </a:rPr>
-              <a:t> Yet, these changes were relatively small: R</a:t>
-            </a:r>
-            <a:r>
-              <a:rPr b="0" lang="en-US" sz="3600" spc="-1" strike="noStrike" baseline="33000">
-                <a:solidFill>
-                  <a:srgbClr val="000000"/>
-                </a:solidFill>
-                <a:latin typeface="Segoe UI Black"/>
-                <a:ea typeface="Segoe UI Black"/>
-              </a:rPr>
-              <a:t>2</a:t>
-            </a:r>
+              <a:t> We identified various concordantly significant predictors across diffusion approaches (with the exception of socio-demographics).</a:t>
+            </a:r>
+            <a:endParaRPr b="0" lang="en-GB" sz="3600" spc="-1" strike="noStrike">
+              <a:latin typeface="Arial"/>
+            </a:endParaRPr>
+          </a:p>
+          <a:p>
+            <a:pPr>
+              <a:lnSpc>
+                <a:spcPct val="150000"/>
+              </a:lnSpc>
+              <a:buNone/>
+            </a:pPr>
+            <a:endParaRPr b="0" lang="en-GB" sz="3600" spc="-1" strike="noStrike">
+              <a:latin typeface="Arial"/>
+            </a:endParaRPr>
+          </a:p>
+          <a:p>
+            <a:pPr>
+              <a:lnSpc>
+                <a:spcPct val="150000"/>
+              </a:lnSpc>
+              <a:buNone/>
+            </a:pPr>
+            <a:endParaRPr b="0" lang="en-GB" sz="3600" spc="-1" strike="noStrike">
+              <a:latin typeface="Arial"/>
+            </a:endParaRPr>
+          </a:p>
+          <a:p>
+            <a:pPr>
+              <a:lnSpc>
+                <a:spcPct val="150000"/>
+              </a:lnSpc>
+              <a:buNone/>
+            </a:pPr>
+            <a:endParaRPr b="0" lang="en-GB" sz="3600" spc="-1" strike="noStrike">
+              <a:latin typeface="Arial"/>
+            </a:endParaRPr>
+          </a:p>
+          <a:p>
+            <a:pPr>
+              <a:lnSpc>
+                <a:spcPct val="150000"/>
+              </a:lnSpc>
+              <a:buNone/>
+            </a:pPr>
+            <a:endParaRPr b="0" lang="en-GB" sz="3600" spc="-1" strike="noStrike">
+              <a:latin typeface="Arial"/>
+            </a:endParaRPr>
+          </a:p>
+          <a:p>
+            <a:pPr>
+              <a:lnSpc>
+                <a:spcPct val="150000"/>
+              </a:lnSpc>
+              <a:buNone/>
+            </a:pPr>
+            <a:endParaRPr b="0" lang="en-GB" sz="3600" spc="-1" strike="noStrike">
+              <a:latin typeface="Arial"/>
+            </a:endParaRPr>
+          </a:p>
+          <a:p>
+            <a:pPr>
+              <a:lnSpc>
+                <a:spcPct val="150000"/>
+              </a:lnSpc>
+              <a:buNone/>
+            </a:pPr>
+            <a:endParaRPr b="0" lang="en-GB" sz="3600" spc="-1" strike="noStrike">
+              <a:latin typeface="Arial"/>
+            </a:endParaRPr>
+          </a:p>
+          <a:p>
+            <a:pPr>
+              <a:lnSpc>
+                <a:spcPct val="150000"/>
+              </a:lnSpc>
+              <a:buNone/>
+            </a:pPr>
+            <a:endParaRPr b="0" lang="en-GB" sz="3600" spc="-1" strike="noStrike">
+              <a:latin typeface="Arial"/>
+            </a:endParaRPr>
+          </a:p>
+          <a:p>
+            <a:pPr>
+              <a:lnSpc>
+                <a:spcPct val="150000"/>
+              </a:lnSpc>
+              <a:buNone/>
+            </a:pPr>
+            <a:endParaRPr b="0" lang="en-GB" sz="3600" spc="-1" strike="noStrike">
+              <a:latin typeface="Arial"/>
+            </a:endParaRPr>
+          </a:p>
+          <a:p>
+            <a:pPr>
+              <a:lnSpc>
+                <a:spcPct val="150000"/>
+              </a:lnSpc>
+              <a:buNone/>
+            </a:pPr>
+            <a:endParaRPr b="0" lang="en-GB" sz="3600" spc="-1" strike="noStrike">
+              <a:latin typeface="Arial"/>
+            </a:endParaRPr>
+          </a:p>
+          <a:p>
+            <a:pPr>
+              <a:lnSpc>
+                <a:spcPct val="150000"/>
+              </a:lnSpc>
+              <a:buNone/>
+            </a:pPr>
+            <a:endParaRPr b="0" lang="en-GB" sz="3600" spc="-1" strike="noStrike">
+              <a:latin typeface="Arial"/>
+            </a:endParaRPr>
+          </a:p>
+          <a:p>
+            <a:pPr>
+              <a:lnSpc>
+                <a:spcPct val="150000"/>
+              </a:lnSpc>
+              <a:buNone/>
+            </a:pPr>
+            <a:endParaRPr b="0" lang="en-GB" sz="3600" spc="-1" strike="noStrike">
+              <a:latin typeface="Arial"/>
+            </a:endParaRPr>
+          </a:p>
+          <a:p>
+            <a:pPr>
+              <a:lnSpc>
+                <a:spcPct val="150000"/>
+              </a:lnSpc>
+              <a:buNone/>
+            </a:pPr>
             <a:r>
               <a:rPr b="0" lang="en-US" sz="3600" spc="-1" strike="noStrike">
                 <a:solidFill>
@@ -3415,7 +3896,7 @@
                 <a:latin typeface="Segoe UI Black"/>
                 <a:ea typeface="Segoe UI Black"/>
               </a:rPr>
-              <a:t>&lt;3%.</a:t>
+              <a:t>Single health and lifestyle factors were most predictive of BA, with waist-to-hip-ratio, diabetes, hypertension and related diagnoses, smoking status, coffee consumption being indicative of a higher BA. An inverse relationship was found between BA and birth weight. Finally, higher health satisfaction, self-rated health, and digit substitution scores were indicative of lower brain ages.</a:t>
             </a:r>
             <a:endParaRPr b="0" lang="en-GB" sz="3600" spc="-1" strike="noStrike">
               <a:latin typeface="Arial"/>
@@ -3425,215 +3906,7 @@
       </p:sp>
       <p:pic>
         <p:nvPicPr>
-          <p:cNvPr id="52" name="" descr=""/>
-          <p:cNvPicPr/>
-          <p:nvPr/>
-        </p:nvPicPr>
-        <p:blipFill>
-          <a:blip r:embed="rId1"/>
-          <a:stretch/>
-        </p:blipFill>
-        <p:spPr>
-          <a:xfrm>
-            <a:off x="4669920" y="39248640"/>
-            <a:ext cx="1078920" cy="1078920"/>
-          </a:xfrm>
-          <a:prstGeom prst="rect">
-            <a:avLst/>
-          </a:prstGeom>
-          <a:ln w="0">
-            <a:noFill/>
-          </a:ln>
-        </p:spPr>
-      </p:pic>
-      <p:pic>
-        <p:nvPicPr>
-          <p:cNvPr id="53" name="" descr=""/>
-          <p:cNvPicPr/>
-          <p:nvPr/>
-        </p:nvPicPr>
-        <p:blipFill>
-          <a:blip r:embed="rId2"/>
-          <a:stretch/>
-        </p:blipFill>
-        <p:spPr>
-          <a:xfrm>
-            <a:off x="462600" y="38619360"/>
-            <a:ext cx="3983760" cy="1152360"/>
-          </a:xfrm>
-          <a:prstGeom prst="rect">
-            <a:avLst/>
-          </a:prstGeom>
-          <a:ln w="0">
-            <a:noFill/>
-          </a:ln>
-        </p:spPr>
-      </p:pic>
-      <p:pic>
-        <p:nvPicPr>
-          <p:cNvPr id="54" name="" descr=""/>
-          <p:cNvPicPr/>
-          <p:nvPr/>
-        </p:nvPicPr>
-        <p:blipFill>
-          <a:blip r:embed="rId3"/>
-          <a:stretch/>
-        </p:blipFill>
-        <p:spPr>
-          <a:xfrm>
-            <a:off x="451080" y="40028040"/>
-            <a:ext cx="3687840" cy="937440"/>
-          </a:xfrm>
-          <a:prstGeom prst="rect">
-            <a:avLst/>
-          </a:prstGeom>
-          <a:ln w="0">
-            <a:noFill/>
-          </a:ln>
-        </p:spPr>
-      </p:pic>
-      <p:sp>
-        <p:nvSpPr>
-          <p:cNvPr id="55" name="TextBox 3"/>
-          <p:cNvSpPr/>
-          <p:nvPr/>
-        </p:nvSpPr>
-        <p:spPr>
-          <a:xfrm>
-            <a:off x="1882800" y="33779520"/>
-            <a:ext cx="28536480" cy="4156200"/>
-          </a:xfrm>
-          <a:prstGeom prst="rect">
-            <a:avLst/>
-          </a:prstGeom>
-          <a:solidFill>
-            <a:srgbClr val="f2f2f2"/>
-          </a:solidFill>
-          <a:ln w="0">
-            <a:noFill/>
-          </a:ln>
-        </p:spPr>
-        <p:style>
-          <a:lnRef idx="0"/>
-          <a:fillRef idx="0"/>
-          <a:effectRef idx="0"/>
-          <a:fontRef idx="minor"/>
-        </p:style>
-        <p:txBody>
-          <a:bodyPr lIns="432360" rIns="432360" tIns="432360" bIns="432360" anchor="t">
-            <a:spAutoFit/>
-          </a:bodyPr>
-          <a:p>
-            <a:pPr>
-              <a:lnSpc>
-                <a:spcPct val="150000"/>
-              </a:lnSpc>
-              <a:buNone/>
-            </a:pPr>
-            <a:r>
-              <a:rPr b="1" lang="en-US" sz="3600" spc="-1" strike="noStrike">
-                <a:solidFill>
-                  <a:srgbClr val="000000"/>
-                </a:solidFill>
-                <a:latin typeface="Segoe UI"/>
-                <a:ea typeface="Segoe UI Black"/>
-              </a:rPr>
-              <a:t>Conclusion:</a:t>
-            </a:r>
-            <a:r>
-              <a:rPr b="0" lang="en-US" sz="3600" spc="-1" strike="noStrike">
-                <a:solidFill>
-                  <a:srgbClr val="000000"/>
-                </a:solidFill>
-                <a:latin typeface="Segoe UI"/>
-                <a:ea typeface="Segoe UI Black"/>
-              </a:rPr>
-              <a:t> As previously assumed, our results indicate BA as a general marker of health. Moreover, associations of white matter BA with bio-psycho-social factors are robust to different microsructure modelling assumptions. A potentially fruitful guiding principal for future brain age associations research could be to focus on measures which are directly or indirectly related to or reflect pathology.</a:t>
-            </a:r>
-            <a:endParaRPr b="0" lang="en-GB" sz="3600" spc="-1" strike="noStrike">
-              <a:latin typeface="Arial"/>
-            </a:endParaRPr>
-          </a:p>
-        </p:txBody>
-      </p:sp>
-      <p:sp>
-        <p:nvSpPr>
-          <p:cNvPr id="56" name=""/>
-          <p:cNvSpPr/>
-          <p:nvPr/>
-        </p:nvSpPr>
-        <p:spPr>
-          <a:xfrm>
-            <a:off x="27450720" y="40409640"/>
-            <a:ext cx="7199640" cy="1634760"/>
-          </a:xfrm>
-          <a:prstGeom prst="rect">
-            <a:avLst/>
-          </a:prstGeom>
-          <a:noFill/>
-          <a:ln w="0">
-            <a:noFill/>
-          </a:ln>
-        </p:spPr>
-        <p:style>
-          <a:lnRef idx="0"/>
-          <a:fillRef idx="0"/>
-          <a:effectRef idx="0"/>
-          <a:fontRef idx="minor"/>
-        </p:style>
-        <p:txBody>
-          <a:bodyPr lIns="90000" rIns="90000" tIns="45000" bIns="45000" anchor="t">
-            <a:noAutofit/>
-          </a:bodyPr>
-          <a:p>
-            <a:pPr>
-              <a:lnSpc>
-                <a:spcPct val="100000"/>
-              </a:lnSpc>
-              <a:buNone/>
-            </a:pPr>
-            <a:r>
-              <a:rPr b="0" lang="en-US" sz="3600" spc="-1" strike="noStrike">
-                <a:solidFill>
-                  <a:srgbClr val="ffffff"/>
-                </a:solidFill>
-                <a:latin typeface="Segoe UI Light"/>
-                <a:ea typeface="DejaVu Sans"/>
-              </a:rPr>
-              <a:t>To the paper</a:t>
-            </a:r>
-            <a:endParaRPr b="0" lang="en-GB" sz="3600" spc="-1" strike="noStrike">
-              <a:latin typeface="Arial"/>
-            </a:endParaRPr>
-          </a:p>
-        </p:txBody>
-      </p:sp>
-      <p:pic>
-        <p:nvPicPr>
-          <p:cNvPr id="57" name="" descr=""/>
-          <p:cNvPicPr/>
-          <p:nvPr/>
-        </p:nvPicPr>
-        <p:blipFill>
-          <a:blip r:embed="rId4"/>
-          <a:stretch/>
-        </p:blipFill>
-        <p:spPr>
-          <a:xfrm>
-            <a:off x="3058920" y="25700040"/>
-            <a:ext cx="11805480" cy="7090920"/>
-          </a:xfrm>
-          <a:prstGeom prst="rect">
-            <a:avLst/>
-          </a:prstGeom>
-          <a:ln w="0">
-            <a:noFill/>
-          </a:ln>
-        </p:spPr>
-      </p:pic>
-      <p:pic>
-        <p:nvPicPr>
-          <p:cNvPr id="58" name="" descr=""/>
+          <p:cNvPr id="60" name="" descr=""/>
           <p:cNvPicPr/>
           <p:nvPr/>
         </p:nvPicPr>
@@ -3643,8 +3916,8 @@
         </p:blipFill>
         <p:spPr>
           <a:xfrm>
-            <a:off x="8561520" y="14717160"/>
-            <a:ext cx="7669800" cy="7669800"/>
+            <a:off x="27261360" y="36995040"/>
+            <a:ext cx="3447000" cy="3447000"/>
           </a:xfrm>
           <a:prstGeom prst="rect">
             <a:avLst/>
@@ -3654,319 +3927,29 @@
           </a:ln>
         </p:spPr>
       </p:pic>
-      <p:sp>
-        <p:nvSpPr>
-          <p:cNvPr id="59" name=""/>
-          <p:cNvSpPr txBox="1"/>
+      <p:pic>
+        <p:nvPicPr>
+          <p:cNvPr id="61" name="" descr=""/>
+          <p:cNvPicPr/>
           <p:nvPr/>
-        </p:nvSpPr>
-        <p:spPr>
-          <a:xfrm>
-            <a:off x="9000000" y="22455360"/>
-            <a:ext cx="7200000" cy="717120"/>
-          </a:xfrm>
-          <a:prstGeom prst="rect">
-            <a:avLst/>
-          </a:prstGeom>
-          <a:noFill/>
-          <a:ln w="0">
-            <a:noFill/>
-          </a:ln>
-        </p:spPr>
-        <p:txBody>
-          <a:bodyPr lIns="90000" rIns="90000" tIns="45000" bIns="45000" anchor="t">
-            <a:noAutofit/>
-          </a:bodyPr>
-          <a:p>
-            <a:r>
-              <a:rPr b="0" lang="en-US" sz="1000" spc="-1" strike="noStrike">
-                <a:solidFill>
-                  <a:srgbClr val="000000"/>
-                </a:solidFill>
-                <a:latin typeface="Segoe UI Black"/>
-                <a:ea typeface="Segoe UI Black"/>
-              </a:rPr>
-              <a:t>WMTI = white matter tract integrity, SMT mc = multi-compartment spherical mean technique,  SMT =  spherical mean technique, MEAN = whole brain average brain age, FULL = all diffusion features combined, DTI = diffusion tensor imaging, DKI = diffusion kurtosis imaging, BRIA = Bayesian rotationally invariant approach.</a:t>
-            </a:r>
-            <a:endParaRPr b="0" lang="en-GB" sz="1000" spc="-1" strike="noStrike">
-              <a:latin typeface="Arial"/>
-            </a:endParaRPr>
-          </a:p>
-        </p:txBody>
-      </p:sp>
-      <p:sp>
-        <p:nvSpPr>
-          <p:cNvPr id="60" name="Rectangle 5"/>
-          <p:cNvSpPr/>
-          <p:nvPr/>
-        </p:nvSpPr>
-        <p:spPr>
-          <a:xfrm>
-            <a:off x="17098200" y="14440680"/>
-            <a:ext cx="13401720" cy="18679320"/>
-          </a:xfrm>
-          <a:prstGeom prst="rect">
-            <a:avLst/>
-          </a:prstGeom>
-          <a:solidFill>
-            <a:srgbClr val="ffffff"/>
-          </a:solidFill>
-          <a:ln w="25560">
-            <a:noFill/>
-          </a:ln>
-          <a:effectLst>
-            <a:outerShdw dist="114042" dir="2700000" blurRad="723960" rotWithShape="0">
-              <a:srgbClr val="000000">
-                <a:alpha val="10000"/>
-              </a:srgbClr>
-            </a:outerShdw>
-          </a:effectLst>
-        </p:spPr>
-        <p:style>
-          <a:lnRef idx="0"/>
-          <a:fillRef idx="0"/>
-          <a:effectRef idx="0"/>
-          <a:fontRef idx="minor"/>
-        </p:style>
-        <p:txBody>
-          <a:bodyPr lIns="90000" rIns="90000" tIns="45000" bIns="45000" anchor="ctr">
-            <a:noAutofit/>
-          </a:bodyPr>
-          <a:p>
-            <a:pPr algn="ctr">
-              <a:lnSpc>
-                <a:spcPct val="100000"/>
-              </a:lnSpc>
-              <a:buNone/>
-            </a:pPr>
-            <a:r>
-              <a:rPr b="0" lang="en-US" sz="1700" spc="-1" strike="noStrike">
-                <a:solidFill>
-                  <a:srgbClr val="ffffff"/>
-                </a:solidFill>
-                <a:latin typeface="Calibri"/>
-                <a:ea typeface="DejaVu Sans"/>
-              </a:rPr>
-              <a:t>v</a:t>
-            </a:r>
-            <a:endParaRPr b="0" lang="en-GB" sz="1700" spc="-1" strike="noStrike">
-              <a:latin typeface="Arial"/>
-            </a:endParaRPr>
-          </a:p>
-        </p:txBody>
-      </p:sp>
-      <p:sp>
-        <p:nvSpPr>
-          <p:cNvPr id="61" name="TextBox 5"/>
-          <p:cNvSpPr/>
-          <p:nvPr/>
-        </p:nvSpPr>
-        <p:spPr>
-          <a:xfrm>
-            <a:off x="17360640" y="14544000"/>
-            <a:ext cx="12779280" cy="18195480"/>
-          </a:xfrm>
-          <a:prstGeom prst="rect">
-            <a:avLst/>
-          </a:prstGeom>
-          <a:noFill/>
-          <a:ln w="0">
-            <a:noFill/>
-          </a:ln>
-        </p:spPr>
-        <p:style>
-          <a:lnRef idx="0"/>
-          <a:fillRef idx="0"/>
-          <a:effectRef idx="0"/>
-          <a:fontRef idx="minor"/>
-        </p:style>
-        <p:txBody>
-          <a:bodyPr lIns="90000" rIns="90000" tIns="45000" bIns="45000" anchor="t">
-            <a:spAutoFit/>
-          </a:bodyPr>
-          <a:p>
-            <a:pPr>
-              <a:lnSpc>
-                <a:spcPct val="150000"/>
-              </a:lnSpc>
-              <a:buNone/>
-            </a:pPr>
-            <a:r>
-              <a:rPr b="1" lang="en-US" sz="3600" spc="-1" strike="noStrike">
-                <a:solidFill>
-                  <a:srgbClr val="000000"/>
-                </a:solidFill>
-                <a:latin typeface="Segoe UI Black"/>
-                <a:ea typeface="Segoe UI Black"/>
-              </a:rPr>
-              <a:t>Result 3:</a:t>
-            </a:r>
-            <a:r>
-              <a:rPr b="0" lang="en-US" sz="3600" spc="-1" strike="noStrike">
-                <a:solidFill>
-                  <a:srgbClr val="000000"/>
-                </a:solidFill>
-                <a:latin typeface="Segoe UI Black"/>
-                <a:ea typeface="Segoe UI Black"/>
-              </a:rPr>
-              <a:t> While bio-psycho-social variables were limited in adding explained variance to the baseline BA models, we identified various concordantly significant predictors across diffusion approaches (with the exception of socio-demographics).</a:t>
-            </a:r>
-            <a:endParaRPr b="0" lang="en-GB" sz="3600" spc="-1" strike="noStrike">
-              <a:latin typeface="Arial"/>
-            </a:endParaRPr>
-          </a:p>
-          <a:p>
-            <a:pPr>
-              <a:lnSpc>
-                <a:spcPct val="150000"/>
-              </a:lnSpc>
-              <a:buNone/>
-            </a:pPr>
-            <a:endParaRPr b="0" lang="en-GB" sz="3600" spc="-1" strike="noStrike">
-              <a:latin typeface="Arial"/>
-            </a:endParaRPr>
-          </a:p>
-          <a:p>
-            <a:pPr>
-              <a:lnSpc>
-                <a:spcPct val="150000"/>
-              </a:lnSpc>
-              <a:buNone/>
-            </a:pPr>
-            <a:endParaRPr b="0" lang="en-GB" sz="3600" spc="-1" strike="noStrike">
-              <a:latin typeface="Arial"/>
-            </a:endParaRPr>
-          </a:p>
-          <a:p>
-            <a:pPr>
-              <a:lnSpc>
-                <a:spcPct val="150000"/>
-              </a:lnSpc>
-              <a:buNone/>
-            </a:pPr>
-            <a:endParaRPr b="0" lang="en-GB" sz="3600" spc="-1" strike="noStrike">
-              <a:latin typeface="Arial"/>
-            </a:endParaRPr>
-          </a:p>
-          <a:p>
-            <a:pPr>
-              <a:lnSpc>
-                <a:spcPct val="150000"/>
-              </a:lnSpc>
-              <a:buNone/>
-            </a:pPr>
-            <a:endParaRPr b="0" lang="en-GB" sz="3600" spc="-1" strike="noStrike">
-              <a:latin typeface="Arial"/>
-            </a:endParaRPr>
-          </a:p>
-          <a:p>
-            <a:pPr>
-              <a:lnSpc>
-                <a:spcPct val="150000"/>
-              </a:lnSpc>
-              <a:buNone/>
-            </a:pPr>
-            <a:endParaRPr b="0" lang="en-GB" sz="3600" spc="-1" strike="noStrike">
-              <a:latin typeface="Arial"/>
-            </a:endParaRPr>
-          </a:p>
-          <a:p>
-            <a:pPr>
-              <a:lnSpc>
-                <a:spcPct val="150000"/>
-              </a:lnSpc>
-              <a:buNone/>
-            </a:pPr>
-            <a:endParaRPr b="0" lang="en-GB" sz="3600" spc="-1" strike="noStrike">
-              <a:latin typeface="Arial"/>
-            </a:endParaRPr>
-          </a:p>
-          <a:p>
-            <a:pPr>
-              <a:lnSpc>
-                <a:spcPct val="150000"/>
-              </a:lnSpc>
-              <a:buNone/>
-            </a:pPr>
-            <a:endParaRPr b="0" lang="en-GB" sz="3600" spc="-1" strike="noStrike">
-              <a:latin typeface="Arial"/>
-            </a:endParaRPr>
-          </a:p>
-          <a:p>
-            <a:pPr>
-              <a:lnSpc>
-                <a:spcPct val="150000"/>
-              </a:lnSpc>
-              <a:buNone/>
-            </a:pPr>
-            <a:endParaRPr b="0" lang="en-GB" sz="3600" spc="-1" strike="noStrike">
-              <a:latin typeface="Arial"/>
-            </a:endParaRPr>
-          </a:p>
-          <a:p>
-            <a:pPr>
-              <a:lnSpc>
-                <a:spcPct val="150000"/>
-              </a:lnSpc>
-              <a:buNone/>
-            </a:pPr>
-            <a:endParaRPr b="0" lang="en-GB" sz="3600" spc="-1" strike="noStrike">
-              <a:latin typeface="Arial"/>
-            </a:endParaRPr>
-          </a:p>
-          <a:p>
-            <a:pPr>
-              <a:lnSpc>
-                <a:spcPct val="150000"/>
-              </a:lnSpc>
-              <a:buNone/>
-            </a:pPr>
-            <a:r>
-              <a:rPr b="0" lang="en-US" sz="3600" spc="-1" strike="noStrike">
-                <a:solidFill>
-                  <a:srgbClr val="000000"/>
-                </a:solidFill>
-                <a:latin typeface="Segoe UI Black"/>
-                <a:ea typeface="Segoe UI Black"/>
-              </a:rPr>
-              <a:t>Single health and lifestyle factors were most predictive of BA, with waist-to-hip-ratio</a:t>
-            </a:r>
-            <a:r>
-              <a:rPr b="0" lang="en-US" sz="3600" spc="-1" strike="noStrike">
-                <a:solidFill>
-                  <a:srgbClr val="000000"/>
-                </a:solidFill>
-                <a:latin typeface="Segoe UI Black"/>
-                <a:ea typeface="Segoe UI Black"/>
-              </a:rPr>
-              <a:t>, diabetes, hypertension and related diagnoses, smoking status, coffee consumption being indicative of a higher BA. An inverse relationship was found between BA and birth weight. </a:t>
-            </a:r>
-            <a:r>
-              <a:rPr b="0" lang="en-US" sz="3600" spc="-1" strike="noStrike">
-                <a:solidFill>
-                  <a:srgbClr val="000000"/>
-                </a:solidFill>
-                <a:latin typeface="Segoe UI Black"/>
-                <a:ea typeface="Segoe UI Black"/>
-              </a:rPr>
-              <a:t>Finally, higher </a:t>
-            </a:r>
-            <a:r>
-              <a:rPr b="0" lang="en-US" sz="3600" spc="-1" strike="noStrike">
-                <a:solidFill>
-                  <a:srgbClr val="000000"/>
-                </a:solidFill>
-                <a:latin typeface="Segoe UI Black"/>
-                <a:ea typeface="Segoe UI Black"/>
-              </a:rPr>
-              <a:t>health satisfaction, self-rated health, and digit substitution scores were indicative of lower brain ages.</a:t>
-            </a:r>
-            <a:endParaRPr b="0" lang="en-GB" sz="3600" spc="-1" strike="noStrike">
-              <a:latin typeface="Arial"/>
-            </a:endParaRPr>
-          </a:p>
-        </p:txBody>
-      </p:sp>
+        </p:nvPicPr>
+        <p:blipFill>
+          <a:blip r:embed="rId6"/>
+          <a:stretch/>
+        </p:blipFill>
+        <p:spPr>
+          <a:xfrm>
+            <a:off x="8186760" y="14580000"/>
+            <a:ext cx="7648920" cy="7648920"/>
+          </a:xfrm>
+          <a:prstGeom prst="rect">
+            <a:avLst/>
+          </a:prstGeom>
+          <a:ln w="0">
+            <a:noFill/>
+          </a:ln>
+        </p:spPr>
+      </p:pic>
       <p:pic>
         <p:nvPicPr>
           <p:cNvPr id="62" name="" descr=""/>
@@ -3974,36 +3957,13 @@
           <p:nvPr/>
         </p:nvPicPr>
         <p:blipFill>
-          <a:blip r:embed="rId6"/>
-          <a:stretch/>
-        </p:blipFill>
-        <p:spPr>
-          <a:xfrm>
-            <a:off x="18114480" y="18871560"/>
-            <a:ext cx="11199240" cy="7466040"/>
-          </a:xfrm>
-          <a:prstGeom prst="rect">
-            <a:avLst/>
-          </a:prstGeom>
-          <a:ln w="0">
-            <a:noFill/>
-          </a:ln>
-        </p:spPr>
-      </p:pic>
-      <p:pic>
-        <p:nvPicPr>
-          <p:cNvPr id="63" name="" descr=""/>
-          <p:cNvPicPr/>
-          <p:nvPr/>
-        </p:nvPicPr>
-        <p:blipFill>
           <a:blip r:embed="rId7"/>
           <a:stretch/>
         </p:blipFill>
         <p:spPr>
           <a:xfrm>
-            <a:off x="27261360" y="36995040"/>
-            <a:ext cx="3447360" cy="3447360"/>
+            <a:off x="17360640" y="17373960"/>
+            <a:ext cx="12819600" cy="8546040"/>
           </a:xfrm>
           <a:prstGeom prst="rect">
             <a:avLst/>

</xml_diff>